<commit_message>
Diseño pantalla Nueva línea y comentarios funcionalidad
</commit_message>
<xml_diff>
--- a/MikaAndroid/Documentación/Diseño pantallas.pptx
+++ b/MikaAndroid/Documentación/Diseño pantallas.pptx
@@ -5,14 +5,15 @@
     <p:sldMasterId id="2147483648" r:id="rId1"/>
   </p:sldMasterIdLst>
   <p:notesMasterIdLst>
-    <p:notesMasterId r:id="rId7"/>
+    <p:notesMasterId r:id="rId8"/>
   </p:notesMasterIdLst>
   <p:sldIdLst>
     <p:sldId id="256" r:id="rId2"/>
     <p:sldId id="261" r:id="rId3"/>
     <p:sldId id="262" r:id="rId4"/>
     <p:sldId id="263" r:id="rId5"/>
-    <p:sldId id="264" r:id="rId6"/>
+    <p:sldId id="265" r:id="rId6"/>
+    <p:sldId id="264" r:id="rId7"/>
   </p:sldIdLst>
   <p:sldSz cx="12192000" cy="6858000"/>
   <p:notesSz cx="6858000" cy="9144000"/>
@@ -482,7 +483,7 @@
           <a:p>
             <a:fld id="{D57F6B43-8E4F-40FD-8D5E-54C67B9DAF0C}" type="datetimeFigureOut">
               <a:rPr lang="es-ES" smtClean="0"/>
-              <a:t>26/03/2024</a:t>
+              <a:t>14/05/2024</a:t>
             </a:fld>
             <a:endParaRPr lang="es-ES"/>
           </a:p>
@@ -896,7 +897,7 @@
           <a:p>
             <a:fld id="{1C13BEBA-C70B-47AE-A837-578EE0651D4F}" type="datetimeFigureOut">
               <a:rPr lang="es-ES" smtClean="0"/>
-              <a:t>26/03/2024</a:t>
+              <a:t>14/05/2024</a:t>
             </a:fld>
             <a:endParaRPr lang="es-ES"/>
           </a:p>
@@ -1094,7 +1095,7 @@
           <a:p>
             <a:fld id="{1C13BEBA-C70B-47AE-A837-578EE0651D4F}" type="datetimeFigureOut">
               <a:rPr lang="es-ES" smtClean="0"/>
-              <a:t>26/03/2024</a:t>
+              <a:t>14/05/2024</a:t>
             </a:fld>
             <a:endParaRPr lang="es-ES"/>
           </a:p>
@@ -1302,7 +1303,7 @@
           <a:p>
             <a:fld id="{1C13BEBA-C70B-47AE-A837-578EE0651D4F}" type="datetimeFigureOut">
               <a:rPr lang="es-ES" smtClean="0"/>
-              <a:t>26/03/2024</a:t>
+              <a:t>14/05/2024</a:t>
             </a:fld>
             <a:endParaRPr lang="es-ES"/>
           </a:p>
@@ -1500,7 +1501,7 @@
           <a:p>
             <a:fld id="{1C13BEBA-C70B-47AE-A837-578EE0651D4F}" type="datetimeFigureOut">
               <a:rPr lang="es-ES" smtClean="0"/>
-              <a:t>26/03/2024</a:t>
+              <a:t>14/05/2024</a:t>
             </a:fld>
             <a:endParaRPr lang="es-ES"/>
           </a:p>
@@ -1775,7 +1776,7 @@
           <a:p>
             <a:fld id="{1C13BEBA-C70B-47AE-A837-578EE0651D4F}" type="datetimeFigureOut">
               <a:rPr lang="es-ES" smtClean="0"/>
-              <a:t>26/03/2024</a:t>
+              <a:t>14/05/2024</a:t>
             </a:fld>
             <a:endParaRPr lang="es-ES"/>
           </a:p>
@@ -2040,7 +2041,7 @@
           <a:p>
             <a:fld id="{1C13BEBA-C70B-47AE-A837-578EE0651D4F}" type="datetimeFigureOut">
               <a:rPr lang="es-ES" smtClean="0"/>
-              <a:t>26/03/2024</a:t>
+              <a:t>14/05/2024</a:t>
             </a:fld>
             <a:endParaRPr lang="es-ES"/>
           </a:p>
@@ -2452,7 +2453,7 @@
           <a:p>
             <a:fld id="{1C13BEBA-C70B-47AE-A837-578EE0651D4F}" type="datetimeFigureOut">
               <a:rPr lang="es-ES" smtClean="0"/>
-              <a:t>26/03/2024</a:t>
+              <a:t>14/05/2024</a:t>
             </a:fld>
             <a:endParaRPr lang="es-ES"/>
           </a:p>
@@ -2593,7 +2594,7 @@
           <a:p>
             <a:fld id="{1C13BEBA-C70B-47AE-A837-578EE0651D4F}" type="datetimeFigureOut">
               <a:rPr lang="es-ES" smtClean="0"/>
-              <a:t>26/03/2024</a:t>
+              <a:t>14/05/2024</a:t>
             </a:fld>
             <a:endParaRPr lang="es-ES"/>
           </a:p>
@@ -2706,7 +2707,7 @@
           <a:p>
             <a:fld id="{1C13BEBA-C70B-47AE-A837-578EE0651D4F}" type="datetimeFigureOut">
               <a:rPr lang="es-ES" smtClean="0"/>
-              <a:t>26/03/2024</a:t>
+              <a:t>14/05/2024</a:t>
             </a:fld>
             <a:endParaRPr lang="es-ES"/>
           </a:p>
@@ -3017,7 +3018,7 @@
           <a:p>
             <a:fld id="{1C13BEBA-C70B-47AE-A837-578EE0651D4F}" type="datetimeFigureOut">
               <a:rPr lang="es-ES" smtClean="0"/>
-              <a:t>26/03/2024</a:t>
+              <a:t>14/05/2024</a:t>
             </a:fld>
             <a:endParaRPr lang="es-ES"/>
           </a:p>
@@ -3305,7 +3306,7 @@
           <a:p>
             <a:fld id="{1C13BEBA-C70B-47AE-A837-578EE0651D4F}" type="datetimeFigureOut">
               <a:rPr lang="es-ES" smtClean="0"/>
-              <a:t>26/03/2024</a:t>
+              <a:t>14/05/2024</a:t>
             </a:fld>
             <a:endParaRPr lang="es-ES"/>
           </a:p>
@@ -3546,7 +3547,7 @@
           <a:p>
             <a:fld id="{1C13BEBA-C70B-47AE-A837-578EE0651D4F}" type="datetimeFigureOut">
               <a:rPr lang="es-ES" smtClean="0"/>
-              <a:t>26/03/2024</a:t>
+              <a:t>14/05/2024</a:t>
             </a:fld>
             <a:endParaRPr lang="es-ES"/>
           </a:p>
@@ -5032,6 +5033,41 @@
           </a:prstGeom>
         </p:spPr>
       </p:pic>
+      <p:sp>
+        <p:nvSpPr>
+          <p:cNvPr id="3" name="CuadroTexto 2">
+            <a:extLst>
+              <a:ext uri="{FF2B5EF4-FFF2-40B4-BE49-F238E27FC236}">
+                <a16:creationId xmlns:a16="http://schemas.microsoft.com/office/drawing/2014/main" id="{0E9FA10A-7A6B-541A-CE18-A6D3FAFF1FE5}"/>
+              </a:ext>
+            </a:extLst>
+          </p:cNvPr>
+          <p:cNvSpPr txBox="1"/>
+          <p:nvPr/>
+        </p:nvSpPr>
+        <p:spPr>
+          <a:xfrm>
+            <a:off x="8618706" y="1050587"/>
+            <a:ext cx="3112851" cy="738664"/>
+          </a:xfrm>
+          <a:prstGeom prst="rect">
+            <a:avLst/>
+          </a:prstGeom>
+          <a:noFill/>
+        </p:spPr>
+        <p:txBody>
+          <a:bodyPr wrap="square" rtlCol="0">
+            <a:spAutoFit/>
+          </a:bodyPr>
+          <a:lstStyle/>
+          <a:p>
+            <a:r>
+              <a:rPr lang="es-ES" sz="1400" dirty="0"/>
+              <a:t>* Muestra las fichas metidas sin conexión que están pendientes de sincronizar con la web</a:t>
+            </a:r>
+          </a:p>
+        </p:txBody>
+      </p:sp>
     </p:spTree>
     <p:extLst>
       <p:ext uri="{BB962C8B-B14F-4D97-AF65-F5344CB8AC3E}">
@@ -5247,6 +5283,55 @@
           </a:p>
         </p:txBody>
       </p:sp>
+      <p:sp>
+        <p:nvSpPr>
+          <p:cNvPr id="5" name="CuadroTexto 4">
+            <a:extLst>
+              <a:ext uri="{FF2B5EF4-FFF2-40B4-BE49-F238E27FC236}">
+                <a16:creationId xmlns:a16="http://schemas.microsoft.com/office/drawing/2014/main" id="{AEC7188B-5596-1D48-E9D0-EBD8301C3DDC}"/>
+              </a:ext>
+            </a:extLst>
+          </p:cNvPr>
+          <p:cNvSpPr txBox="1"/>
+          <p:nvPr/>
+        </p:nvSpPr>
+        <p:spPr>
+          <a:xfrm>
+            <a:off x="8608934" y="69120"/>
+            <a:ext cx="3112851" cy="1384995"/>
+          </a:xfrm>
+          <a:prstGeom prst="rect">
+            <a:avLst/>
+          </a:prstGeom>
+          <a:noFill/>
+        </p:spPr>
+        <p:txBody>
+          <a:bodyPr wrap="square" rtlCol="0">
+            <a:spAutoFit/>
+          </a:bodyPr>
+          <a:lstStyle/>
+          <a:p>
+            <a:pPr marL="285750" indent="-285750">
+              <a:buFont typeface="Arial" panose="020B0604020202020204" pitchFamily="34" charset="0"/>
+              <a:buChar char="•"/>
+            </a:pPr>
+            <a:r>
+              <a:rPr lang="es-ES" sz="1400" dirty="0"/>
+              <a:t>Al seleccionar “Nueva Ficha” en el menú principal, la aplicación solicitará seleccionar o crear el cliente de la ficha.</a:t>
+            </a:r>
+          </a:p>
+          <a:p>
+            <a:pPr marL="285750" indent="-285750">
+              <a:buFont typeface="Arial" panose="020B0604020202020204" pitchFamily="34" charset="0"/>
+              <a:buChar char="•"/>
+            </a:pPr>
+            <a:r>
+              <a:rPr lang="es-ES" sz="1400" dirty="0"/>
+              <a:t>Por defecto, aparecerá el cliente por defecto en la lista</a:t>
+            </a:r>
+          </a:p>
+        </p:txBody>
+      </p:sp>
     </p:spTree>
     <p:extLst>
       <p:ext uri="{BB962C8B-B14F-4D97-AF65-F5344CB8AC3E}">
@@ -5377,6 +5462,100 @@
 </file>
 
 <file path=ppt/slides/slide5.xml><?xml version="1.0" encoding="utf-8"?>
+<p:sld xmlns:a="http://schemas.openxmlformats.org/drawingml/2006/main" xmlns:r="http://schemas.openxmlformats.org/officeDocument/2006/relationships" xmlns:p="http://schemas.openxmlformats.org/presentationml/2006/main">
+  <p:cSld>
+    <p:spTree>
+      <p:nvGrpSpPr>
+        <p:cNvPr id="1" name=""/>
+        <p:cNvGrpSpPr/>
+        <p:nvPr/>
+      </p:nvGrpSpPr>
+      <p:grpSpPr>
+        <a:xfrm>
+          <a:off x="0" y="0"/>
+          <a:ext cx="0" cy="0"/>
+          <a:chOff x="0" y="0"/>
+          <a:chExt cx="0" cy="0"/>
+        </a:xfrm>
+      </p:grpSpPr>
+      <p:sp>
+        <p:nvSpPr>
+          <p:cNvPr id="2" name="1 Rectángulo">
+            <a:extLst>
+              <a:ext uri="{FF2B5EF4-FFF2-40B4-BE49-F238E27FC236}">
+                <a16:creationId xmlns:a16="http://schemas.microsoft.com/office/drawing/2014/main" id="{911F81E9-D86F-5DCD-5CF4-36EA51A90C21}"/>
+              </a:ext>
+            </a:extLst>
+          </p:cNvPr>
+          <p:cNvSpPr/>
+          <p:nvPr/>
+        </p:nvSpPr>
+        <p:spPr>
+          <a:xfrm>
+            <a:off x="4349368" y="854901"/>
+            <a:ext cx="1597232" cy="369332"/>
+          </a:xfrm>
+          <a:prstGeom prst="rect">
+            <a:avLst/>
+          </a:prstGeom>
+        </p:spPr>
+        <p:txBody>
+          <a:bodyPr wrap="none">
+            <a:spAutoFit/>
+          </a:bodyPr>
+          <a:lstStyle/>
+          <a:p>
+            <a:r>
+              <a:rPr lang="es-ES" b="1" i="1" cap="all" dirty="0"/>
+              <a:t>Nueva Línea</a:t>
+            </a:r>
+          </a:p>
+        </p:txBody>
+      </p:sp>
+      <p:pic>
+        <p:nvPicPr>
+          <p:cNvPr id="4" name="Imagen 3">
+            <a:extLst>
+              <a:ext uri="{FF2B5EF4-FFF2-40B4-BE49-F238E27FC236}">
+                <a16:creationId xmlns:a16="http://schemas.microsoft.com/office/drawing/2014/main" id="{28AFF44E-01F2-EEE7-F6BD-CA6311EAF18C}"/>
+              </a:ext>
+            </a:extLst>
+          </p:cNvPr>
+          <p:cNvPicPr>
+            <a:picLocks noChangeAspect="1"/>
+          </p:cNvPicPr>
+          <p:nvPr/>
+        </p:nvPicPr>
+        <p:blipFill>
+          <a:blip r:embed="rId2"/>
+          <a:stretch>
+            <a:fillRect/>
+          </a:stretch>
+        </p:blipFill>
+        <p:spPr>
+          <a:xfrm>
+            <a:off x="2205788" y="1633302"/>
+            <a:ext cx="6846570" cy="2501900"/>
+          </a:xfrm>
+          <a:prstGeom prst="rect">
+            <a:avLst/>
+          </a:prstGeom>
+        </p:spPr>
+      </p:pic>
+    </p:spTree>
+    <p:extLst>
+      <p:ext uri="{BB962C8B-B14F-4D97-AF65-F5344CB8AC3E}">
+        <p14:creationId xmlns:p14="http://schemas.microsoft.com/office/powerpoint/2010/main" val="1056799999"/>
+      </p:ext>
+    </p:extLst>
+  </p:cSld>
+  <p:clrMapOvr>
+    <a:masterClrMapping/>
+  </p:clrMapOvr>
+</p:sld>
+</file>
+
+<file path=ppt/slides/slide6.xml><?xml version="1.0" encoding="utf-8"?>
 <p:sld xmlns:a="http://schemas.openxmlformats.org/drawingml/2006/main" xmlns:r="http://schemas.openxmlformats.org/officeDocument/2006/relationships" xmlns:p="http://schemas.openxmlformats.org/presentationml/2006/main">
   <p:cSld>
     <p:spTree>

</xml_diff>